<commit_message>
added picture, updated  intro
</commit_message>
<xml_diff>
--- a/03_Figures/05_LitReview/LitReview_SRQ.pptx
+++ b/03_Figures/05_LitReview/LitReview_SRQ.pptx
@@ -104,6 +104,11 @@
       </a:defRPr>
     </a:lvl9pPr>
   </p:defaultTextStyle>
+  <p:extLst>
+    <p:ext uri="{EFAFB233-063F-42B5-8137-9DF3F51BA10A}">
+      <p15:sldGuideLst xmlns:p15="http://schemas.microsoft.com/office/powerpoint/2012/main"/>
+    </p:ext>
+  </p:extLst>
 </p:presentation>
 </file>
 
@@ -238,7 +243,7 @@
           <a:p>
             <a:fld id="{3F47F25C-A286-A744-AF58-A079C3EAE3BE}" type="datetimeFigureOut">
               <a:rPr lang="en-GB" smtClean="0"/>
-              <a:t>10/07/2016</a:t>
+              <a:t>20/07/2016</a:t>
             </a:fld>
             <a:endParaRPr lang="en-GB"/>
           </a:p>
@@ -408,7 +413,7 @@
           <a:p>
             <a:fld id="{3F47F25C-A286-A744-AF58-A079C3EAE3BE}" type="datetimeFigureOut">
               <a:rPr lang="en-GB" smtClean="0"/>
-              <a:t>10/07/2016</a:t>
+              <a:t>20/07/2016</a:t>
             </a:fld>
             <a:endParaRPr lang="en-GB"/>
           </a:p>
@@ -588,7 +593,7 @@
           <a:p>
             <a:fld id="{3F47F25C-A286-A744-AF58-A079C3EAE3BE}" type="datetimeFigureOut">
               <a:rPr lang="en-GB" smtClean="0"/>
-              <a:t>10/07/2016</a:t>
+              <a:t>20/07/2016</a:t>
             </a:fld>
             <a:endParaRPr lang="en-GB"/>
           </a:p>
@@ -758,7 +763,7 @@
           <a:p>
             <a:fld id="{3F47F25C-A286-A744-AF58-A079C3EAE3BE}" type="datetimeFigureOut">
               <a:rPr lang="en-GB" smtClean="0"/>
-              <a:t>10/07/2016</a:t>
+              <a:t>20/07/2016</a:t>
             </a:fld>
             <a:endParaRPr lang="en-GB"/>
           </a:p>
@@ -1004,7 +1009,7 @@
           <a:p>
             <a:fld id="{3F47F25C-A286-A744-AF58-A079C3EAE3BE}" type="datetimeFigureOut">
               <a:rPr lang="en-GB" smtClean="0"/>
-              <a:t>10/07/2016</a:t>
+              <a:t>20/07/2016</a:t>
             </a:fld>
             <a:endParaRPr lang="en-GB"/>
           </a:p>
@@ -1236,7 +1241,7 @@
           <a:p>
             <a:fld id="{3F47F25C-A286-A744-AF58-A079C3EAE3BE}" type="datetimeFigureOut">
               <a:rPr lang="en-GB" smtClean="0"/>
-              <a:t>10/07/2016</a:t>
+              <a:t>20/07/2016</a:t>
             </a:fld>
             <a:endParaRPr lang="en-GB"/>
           </a:p>
@@ -1603,7 +1608,7 @@
           <a:p>
             <a:fld id="{3F47F25C-A286-A744-AF58-A079C3EAE3BE}" type="datetimeFigureOut">
               <a:rPr lang="en-GB" smtClean="0"/>
-              <a:t>10/07/2016</a:t>
+              <a:t>20/07/2016</a:t>
             </a:fld>
             <a:endParaRPr lang="en-GB"/>
           </a:p>
@@ -1721,7 +1726,7 @@
           <a:p>
             <a:fld id="{3F47F25C-A286-A744-AF58-A079C3EAE3BE}" type="datetimeFigureOut">
               <a:rPr lang="en-GB" smtClean="0"/>
-              <a:t>10/07/2016</a:t>
+              <a:t>20/07/2016</a:t>
             </a:fld>
             <a:endParaRPr lang="en-GB"/>
           </a:p>
@@ -1816,7 +1821,7 @@
           <a:p>
             <a:fld id="{3F47F25C-A286-A744-AF58-A079C3EAE3BE}" type="datetimeFigureOut">
               <a:rPr lang="en-GB" smtClean="0"/>
-              <a:t>10/07/2016</a:t>
+              <a:t>20/07/2016</a:t>
             </a:fld>
             <a:endParaRPr lang="en-GB"/>
           </a:p>
@@ -2093,7 +2098,7 @@
           <a:p>
             <a:fld id="{3F47F25C-A286-A744-AF58-A079C3EAE3BE}" type="datetimeFigureOut">
               <a:rPr lang="en-GB" smtClean="0"/>
-              <a:t>10/07/2016</a:t>
+              <a:t>20/07/2016</a:t>
             </a:fld>
             <a:endParaRPr lang="en-GB"/>
           </a:p>
@@ -2346,7 +2351,7 @@
           <a:p>
             <a:fld id="{3F47F25C-A286-A744-AF58-A079C3EAE3BE}" type="datetimeFigureOut">
               <a:rPr lang="en-GB" smtClean="0"/>
-              <a:t>10/07/2016</a:t>
+              <a:t>20/07/2016</a:t>
             </a:fld>
             <a:endParaRPr lang="en-GB"/>
           </a:p>
@@ -2559,7 +2564,7 @@
           <a:p>
             <a:fld id="{3F47F25C-A286-A744-AF58-A079C3EAE3BE}" type="datetimeFigureOut">
               <a:rPr lang="en-GB" smtClean="0"/>
-              <a:t>10/07/2016</a:t>
+              <a:t>20/07/2016</a:t>
             </a:fld>
             <a:endParaRPr lang="en-GB"/>
           </a:p>
@@ -3243,7 +3248,7 @@
         </p:nvSpPr>
         <p:spPr>
           <a:xfrm>
-            <a:off x="1397000" y="3811586"/>
+            <a:off x="1416050" y="3786187"/>
             <a:ext cx="9372600" cy="2182813"/>
           </a:xfrm>
           <a:prstGeom prst="roundRect">
@@ -3334,8 +3339,8 @@
           <a:p>
             <a:pPr algn="ctr"/>
             <a:r>
-              <a:rPr lang="en-GB" sz="2400" smtClean="0"/>
-              <a:t>Existing Interaction Patterns</a:t>
+              <a:rPr lang="en-GB" sz="2400" dirty="0" smtClean="0"/>
+              <a:t>Methods for User Input in VR</a:t>
             </a:r>
             <a:endParaRPr lang="en-GB" sz="2400" dirty="0"/>
           </a:p>
@@ -3389,7 +3394,11 @@
             <a:pPr algn="ctr"/>
             <a:r>
               <a:rPr lang="en-GB" sz="2400" dirty="0" smtClean="0"/>
-              <a:t>New Interaction Patterns</a:t>
+              <a:t>Enhancing </a:t>
+            </a:r>
+            <a:r>
+              <a:rPr lang="en-GB" sz="2400" dirty="0" smtClean="0"/>
+              <a:t>Interaction Patterns</a:t>
             </a:r>
             <a:endParaRPr lang="en-GB" sz="2400" dirty="0"/>
           </a:p>
@@ -3443,7 +3452,7 @@
             <a:pPr algn="ctr"/>
             <a:r>
               <a:rPr lang="en-GB" sz="2400" dirty="0" smtClean="0"/>
-              <a:t>Enhanced Interaction Patterns</a:t>
+              <a:t>Interaction Patterns in VR</a:t>
             </a:r>
             <a:endParaRPr lang="en-GB" sz="2400" dirty="0"/>
           </a:p>
@@ -3602,6 +3611,91 @@
           </a:fontRef>
         </p:style>
       </p:cxnSp>
+      <p:sp>
+        <p:nvSpPr>
+          <p:cNvPr id="3" name="Plus 2"/>
+          <p:cNvSpPr/>
+          <p:nvPr/>
+        </p:nvSpPr>
+        <p:spPr>
+          <a:xfrm>
+            <a:off x="4381500" y="4668834"/>
+            <a:ext cx="468312" cy="468312"/>
+          </a:xfrm>
+          <a:prstGeom prst="mathPlus">
+            <a:avLst>
+              <a:gd name="adj1" fmla="val 18981"/>
+            </a:avLst>
+          </a:prstGeom>
+        </p:spPr>
+        <p:style>
+          <a:lnRef idx="2">
+            <a:schemeClr val="accent1">
+              <a:shade val="50000"/>
+            </a:schemeClr>
+          </a:lnRef>
+          <a:fillRef idx="1">
+            <a:schemeClr val="accent1"/>
+          </a:fillRef>
+          <a:effectRef idx="0">
+            <a:schemeClr val="accent1"/>
+          </a:effectRef>
+          <a:fontRef idx="minor">
+            <a:schemeClr val="lt1"/>
+          </a:fontRef>
+        </p:style>
+        <p:txBody>
+          <a:bodyPr rtlCol="0" anchor="ctr"/>
+          <a:lstStyle/>
+          <a:p>
+            <a:pPr algn="ctr"/>
+            <a:endParaRPr lang="en-GB"/>
+          </a:p>
+        </p:txBody>
+      </p:sp>
+      <p:sp>
+        <p:nvSpPr>
+          <p:cNvPr id="10" name="Right Arrow 9"/>
+          <p:cNvSpPr/>
+          <p:nvPr/>
+        </p:nvSpPr>
+        <p:spPr>
+          <a:xfrm>
+            <a:off x="7386637" y="4762895"/>
+            <a:ext cx="371475" cy="280191"/>
+          </a:xfrm>
+          <a:prstGeom prst="rightArrow">
+            <a:avLst>
+              <a:gd name="adj1" fmla="val 33370"/>
+              <a:gd name="adj2" fmla="val 55531"/>
+            </a:avLst>
+          </a:prstGeom>
+        </p:spPr>
+        <p:style>
+          <a:lnRef idx="2">
+            <a:schemeClr val="accent1">
+              <a:shade val="50000"/>
+            </a:schemeClr>
+          </a:lnRef>
+          <a:fillRef idx="1">
+            <a:schemeClr val="accent1"/>
+          </a:fillRef>
+          <a:effectRef idx="0">
+            <a:schemeClr val="accent1"/>
+          </a:effectRef>
+          <a:fontRef idx="minor">
+            <a:schemeClr val="lt1"/>
+          </a:fontRef>
+        </p:style>
+        <p:txBody>
+          <a:bodyPr rtlCol="0" anchor="ctr"/>
+          <a:lstStyle/>
+          <a:p>
+            <a:pPr algn="ctr"/>
+            <a:endParaRPr lang="en-GB"/>
+          </a:p>
+        </p:txBody>
+      </p:sp>
     </p:spTree>
     <p:extLst>
       <p:ext uri="{BB962C8B-B14F-4D97-AF65-F5344CB8AC3E}">

</xml_diff>

<commit_message>
merge work from July 20 (#8)
* init todays work

* txs auto checkin

* txs auto checkin

* txs auto checkin

* txs auto checkin

* txs auto checkin

* txs auto checkin

* txs auto checkin

* added picture, updated  intro

* txs auto checkin

* txs auto checkin

* txs auto checkin

* txs auto checkin

* txs auto checkin

* txs auto checkin

* txs auto checkin

* txs auto checkin

* added pics, updated library

* txs auto checkin

* txs auto checkin

* txs auto checkin

* txs auto checkin

* txs auto checkin

* updated lib
</commit_message>
<xml_diff>
--- a/03_Figures/05_LitReview/LitReview_SRQ.pptx
+++ b/03_Figures/05_LitReview/LitReview_SRQ.pptx
@@ -104,6 +104,11 @@
       </a:defRPr>
     </a:lvl9pPr>
   </p:defaultTextStyle>
+  <p:extLst>
+    <p:ext uri="{EFAFB233-063F-42B5-8137-9DF3F51BA10A}">
+      <p15:sldGuideLst xmlns:p15="http://schemas.microsoft.com/office/powerpoint/2012/main"/>
+    </p:ext>
+  </p:extLst>
 </p:presentation>
 </file>
 
@@ -238,7 +243,7 @@
           <a:p>
             <a:fld id="{3F47F25C-A286-A744-AF58-A079C3EAE3BE}" type="datetimeFigureOut">
               <a:rPr lang="en-GB" smtClean="0"/>
-              <a:t>10/07/2016</a:t>
+              <a:t>20/07/2016</a:t>
             </a:fld>
             <a:endParaRPr lang="en-GB"/>
           </a:p>
@@ -408,7 +413,7 @@
           <a:p>
             <a:fld id="{3F47F25C-A286-A744-AF58-A079C3EAE3BE}" type="datetimeFigureOut">
               <a:rPr lang="en-GB" smtClean="0"/>
-              <a:t>10/07/2016</a:t>
+              <a:t>20/07/2016</a:t>
             </a:fld>
             <a:endParaRPr lang="en-GB"/>
           </a:p>
@@ -588,7 +593,7 @@
           <a:p>
             <a:fld id="{3F47F25C-A286-A744-AF58-A079C3EAE3BE}" type="datetimeFigureOut">
               <a:rPr lang="en-GB" smtClean="0"/>
-              <a:t>10/07/2016</a:t>
+              <a:t>20/07/2016</a:t>
             </a:fld>
             <a:endParaRPr lang="en-GB"/>
           </a:p>
@@ -758,7 +763,7 @@
           <a:p>
             <a:fld id="{3F47F25C-A286-A744-AF58-A079C3EAE3BE}" type="datetimeFigureOut">
               <a:rPr lang="en-GB" smtClean="0"/>
-              <a:t>10/07/2016</a:t>
+              <a:t>20/07/2016</a:t>
             </a:fld>
             <a:endParaRPr lang="en-GB"/>
           </a:p>
@@ -1004,7 +1009,7 @@
           <a:p>
             <a:fld id="{3F47F25C-A286-A744-AF58-A079C3EAE3BE}" type="datetimeFigureOut">
               <a:rPr lang="en-GB" smtClean="0"/>
-              <a:t>10/07/2016</a:t>
+              <a:t>20/07/2016</a:t>
             </a:fld>
             <a:endParaRPr lang="en-GB"/>
           </a:p>
@@ -1236,7 +1241,7 @@
           <a:p>
             <a:fld id="{3F47F25C-A286-A744-AF58-A079C3EAE3BE}" type="datetimeFigureOut">
               <a:rPr lang="en-GB" smtClean="0"/>
-              <a:t>10/07/2016</a:t>
+              <a:t>20/07/2016</a:t>
             </a:fld>
             <a:endParaRPr lang="en-GB"/>
           </a:p>
@@ -1603,7 +1608,7 @@
           <a:p>
             <a:fld id="{3F47F25C-A286-A744-AF58-A079C3EAE3BE}" type="datetimeFigureOut">
               <a:rPr lang="en-GB" smtClean="0"/>
-              <a:t>10/07/2016</a:t>
+              <a:t>20/07/2016</a:t>
             </a:fld>
             <a:endParaRPr lang="en-GB"/>
           </a:p>
@@ -1721,7 +1726,7 @@
           <a:p>
             <a:fld id="{3F47F25C-A286-A744-AF58-A079C3EAE3BE}" type="datetimeFigureOut">
               <a:rPr lang="en-GB" smtClean="0"/>
-              <a:t>10/07/2016</a:t>
+              <a:t>20/07/2016</a:t>
             </a:fld>
             <a:endParaRPr lang="en-GB"/>
           </a:p>
@@ -1816,7 +1821,7 @@
           <a:p>
             <a:fld id="{3F47F25C-A286-A744-AF58-A079C3EAE3BE}" type="datetimeFigureOut">
               <a:rPr lang="en-GB" smtClean="0"/>
-              <a:t>10/07/2016</a:t>
+              <a:t>20/07/2016</a:t>
             </a:fld>
             <a:endParaRPr lang="en-GB"/>
           </a:p>
@@ -2093,7 +2098,7 @@
           <a:p>
             <a:fld id="{3F47F25C-A286-A744-AF58-A079C3EAE3BE}" type="datetimeFigureOut">
               <a:rPr lang="en-GB" smtClean="0"/>
-              <a:t>10/07/2016</a:t>
+              <a:t>20/07/2016</a:t>
             </a:fld>
             <a:endParaRPr lang="en-GB"/>
           </a:p>
@@ -2346,7 +2351,7 @@
           <a:p>
             <a:fld id="{3F47F25C-A286-A744-AF58-A079C3EAE3BE}" type="datetimeFigureOut">
               <a:rPr lang="en-GB" smtClean="0"/>
-              <a:t>10/07/2016</a:t>
+              <a:t>20/07/2016</a:t>
             </a:fld>
             <a:endParaRPr lang="en-GB"/>
           </a:p>
@@ -2559,7 +2564,7 @@
           <a:p>
             <a:fld id="{3F47F25C-A286-A744-AF58-A079C3EAE3BE}" type="datetimeFigureOut">
               <a:rPr lang="en-GB" smtClean="0"/>
-              <a:t>10/07/2016</a:t>
+              <a:t>20/07/2016</a:t>
             </a:fld>
             <a:endParaRPr lang="en-GB"/>
           </a:p>
@@ -3243,7 +3248,7 @@
         </p:nvSpPr>
         <p:spPr>
           <a:xfrm>
-            <a:off x="1397000" y="3811586"/>
+            <a:off x="1416050" y="3786187"/>
             <a:ext cx="9372600" cy="2182813"/>
           </a:xfrm>
           <a:prstGeom prst="roundRect">
@@ -3334,8 +3339,8 @@
           <a:p>
             <a:pPr algn="ctr"/>
             <a:r>
-              <a:rPr lang="en-GB" sz="2400" smtClean="0"/>
-              <a:t>Existing Interaction Patterns</a:t>
+              <a:rPr lang="en-GB" sz="2400" dirty="0" smtClean="0"/>
+              <a:t>Methods for User Input in VR</a:t>
             </a:r>
             <a:endParaRPr lang="en-GB" sz="2400" dirty="0"/>
           </a:p>
@@ -3389,7 +3394,11 @@
             <a:pPr algn="ctr"/>
             <a:r>
               <a:rPr lang="en-GB" sz="2400" dirty="0" smtClean="0"/>
-              <a:t>New Interaction Patterns</a:t>
+              <a:t>Enhancing </a:t>
+            </a:r>
+            <a:r>
+              <a:rPr lang="en-GB" sz="2400" dirty="0" smtClean="0"/>
+              <a:t>Interaction Patterns</a:t>
             </a:r>
             <a:endParaRPr lang="en-GB" sz="2400" dirty="0"/>
           </a:p>
@@ -3443,7 +3452,7 @@
             <a:pPr algn="ctr"/>
             <a:r>
               <a:rPr lang="en-GB" sz="2400" dirty="0" smtClean="0"/>
-              <a:t>Enhanced Interaction Patterns</a:t>
+              <a:t>Interaction Patterns in VR</a:t>
             </a:r>
             <a:endParaRPr lang="en-GB" sz="2400" dirty="0"/>
           </a:p>
@@ -3602,6 +3611,91 @@
           </a:fontRef>
         </p:style>
       </p:cxnSp>
+      <p:sp>
+        <p:nvSpPr>
+          <p:cNvPr id="3" name="Plus 2"/>
+          <p:cNvSpPr/>
+          <p:nvPr/>
+        </p:nvSpPr>
+        <p:spPr>
+          <a:xfrm>
+            <a:off x="4381500" y="4668834"/>
+            <a:ext cx="468312" cy="468312"/>
+          </a:xfrm>
+          <a:prstGeom prst="mathPlus">
+            <a:avLst>
+              <a:gd name="adj1" fmla="val 18981"/>
+            </a:avLst>
+          </a:prstGeom>
+        </p:spPr>
+        <p:style>
+          <a:lnRef idx="2">
+            <a:schemeClr val="accent1">
+              <a:shade val="50000"/>
+            </a:schemeClr>
+          </a:lnRef>
+          <a:fillRef idx="1">
+            <a:schemeClr val="accent1"/>
+          </a:fillRef>
+          <a:effectRef idx="0">
+            <a:schemeClr val="accent1"/>
+          </a:effectRef>
+          <a:fontRef idx="minor">
+            <a:schemeClr val="lt1"/>
+          </a:fontRef>
+        </p:style>
+        <p:txBody>
+          <a:bodyPr rtlCol="0" anchor="ctr"/>
+          <a:lstStyle/>
+          <a:p>
+            <a:pPr algn="ctr"/>
+            <a:endParaRPr lang="en-GB"/>
+          </a:p>
+        </p:txBody>
+      </p:sp>
+      <p:sp>
+        <p:nvSpPr>
+          <p:cNvPr id="10" name="Right Arrow 9"/>
+          <p:cNvSpPr/>
+          <p:nvPr/>
+        </p:nvSpPr>
+        <p:spPr>
+          <a:xfrm>
+            <a:off x="7386637" y="4762895"/>
+            <a:ext cx="371475" cy="280191"/>
+          </a:xfrm>
+          <a:prstGeom prst="rightArrow">
+            <a:avLst>
+              <a:gd name="adj1" fmla="val 33370"/>
+              <a:gd name="adj2" fmla="val 55531"/>
+            </a:avLst>
+          </a:prstGeom>
+        </p:spPr>
+        <p:style>
+          <a:lnRef idx="2">
+            <a:schemeClr val="accent1">
+              <a:shade val="50000"/>
+            </a:schemeClr>
+          </a:lnRef>
+          <a:fillRef idx="1">
+            <a:schemeClr val="accent1"/>
+          </a:fillRef>
+          <a:effectRef idx="0">
+            <a:schemeClr val="accent1"/>
+          </a:effectRef>
+          <a:fontRef idx="minor">
+            <a:schemeClr val="lt1"/>
+          </a:fontRef>
+        </p:style>
+        <p:txBody>
+          <a:bodyPr rtlCol="0" anchor="ctr"/>
+          <a:lstStyle/>
+          <a:p>
+            <a:pPr algn="ctr"/>
+            <a:endParaRPr lang="en-GB"/>
+          </a:p>
+        </p:txBody>
+      </p:sp>
     </p:spTree>
     <p:extLst>
       <p:ext uri="{BB962C8B-B14F-4D97-AF65-F5344CB8AC3E}">

</xml_diff>